<commit_message>
Arquivos Metodologia + Diagramas
</commit_message>
<xml_diff>
--- a/Apresentacoes/diagramas_GEO.pptx
+++ b/Apresentacoes/diagramas_GEO.pptx
@@ -21511,7 +21511,7 @@
                             <a:latin typeface="DejaVu Math TeX Gyre" panose="02000503000000000000" charset="0"/>
                             <a:cs typeface="DejaVu Math TeX Gyre" panose="02000503000000000000" charset="0"/>
                           </a:rPr>
-                          <m:t>𝑏</m:t>
+                          <m:t>𝑏𝑒𝑠𝑡</m:t>
                         </m:r>
                       </m:sub>
                     </m:sSub>
@@ -22933,16 +22933,7 @@
                     </a:solidFill>
                     <a:sym typeface="+mn-ea"/>
                   </a:rPr>
-                  <a:t>de </a:t>
-                </a:r>
-                <a:r>
-                  <a:rPr lang="pt-PT" altLang="en-US" sz="1000" b="1">
-                    <a:solidFill>
-                      <a:schemeClr val="tx1"/>
-                    </a:solidFill>
-                    <a:sym typeface="+mn-ea"/>
-                  </a:rPr>
-                  <a:t>cada variável </a:t>
+                  <a:t>de cada variável </a:t>
                 </a:r>
                 <a:r>
                   <a:rPr lang="pt-PT" altLang="en-US" sz="1000">

</xml_diff>